<commit_message>
Updated all phase docs
</commit_message>
<xml_diff>
--- a/Phase 1 Docs/Phase 1 - Presentation.pptx
+++ b/Phase 1 Docs/Phase 1 - Presentation.pptx
@@ -240,7 +240,7 @@
           <a:p>
             <a:fld id="{966D5B4E-BF3E-3B45-A4BA-D6C3B92870D7}" type="datetimeFigureOut">
               <a:rPr lang="en-US" smtClean="0"/>
-              <a:t>2/7/2024</a:t>
+              <a:t>5/8/2024</a:t>
             </a:fld>
             <a:endParaRPr lang="en-US" dirty="0"/>
           </a:p>
@@ -417,7 +417,7 @@
           <a:p>
             <a:fld id="{F5A8621B-8C8E-49BA-8772-41D0FE75A082}" type="datetimeFigureOut">
               <a:rPr lang="en-US" smtClean="0"/>
-              <a:t>2/7/2024</a:t>
+              <a:t>5/8/2024</a:t>
             </a:fld>
             <a:endParaRPr lang="en-US" dirty="0"/>
           </a:p>
@@ -6533,7 +6533,7 @@
                 </a:solidFill>
                 <a:effectLst/>
               </a:rPr>
-              <a:t>After a client uploads a picture of their pet, our image recognition will be able to determine what kind of animal it is, then recommend names based off this information and a couple of other factors such as the animal’s coloring.</a:t>
+              <a:t>After a client uploads a picture of their pet, our image recognition will be able to determine what kind of animal it is, then recommend names based off the animal’s species.</a:t>
             </a:r>
           </a:p>
         </p:txBody>
@@ -6858,547 +6858,6 @@
           <a:xfrm>
             <a:off x="6362330" y="2432483"/>
             <a:ext cx="5517781" cy="3764132"/>
-          </a:xfrm>
-          <a:prstGeom prst="rect">
-            <a:avLst/>
-          </a:prstGeom>
-          <a:noFill/>
-        </p:spPr>
-        <p:txBody>
-          <a:bodyPr vert="horz" lIns="91440" tIns="45720" rIns="91440" bIns="45720" rtlCol="0" anchor="t">
-            <a:normAutofit fontScale="92500" lnSpcReduction="10000"/>
-          </a:bodyPr>
-          <a:lstStyle>
-            <a:defPPr>
-              <a:defRPr lang="en-US"/>
-            </a:defPPr>
-            <a:lvl1pPr indent="0">
-              <a:lnSpc>
-                <a:spcPct val="120000"/>
-              </a:lnSpc>
-              <a:spcBef>
-                <a:spcPts val="0"/>
-              </a:spcBef>
-              <a:buFont typeface="Arial" panose="020B0604020202020204" pitchFamily="34" charset="0"/>
-              <a:buNone/>
-              <a:defRPr sz="2400" cap="none" spc="0" baseline="0">
-                <a:solidFill>
-                  <a:sysClr val="windowText" lastClr="000000"/>
-                </a:solidFill>
-                <a:effectLst/>
-              </a:defRPr>
-            </a:lvl1pPr>
-            <a:lvl2pPr indent="0">
-              <a:lnSpc>
-                <a:spcPct val="150000"/>
-              </a:lnSpc>
-              <a:spcBef>
-                <a:spcPts val="500"/>
-              </a:spcBef>
-              <a:buFont typeface="Arial" panose="020B0604020202020204" pitchFamily="34" charset="0"/>
-              <a:buNone/>
-              <a:defRPr sz="2000">
-                <a:solidFill>
-                  <a:schemeClr val="tx1">
-                    <a:tint val="75000"/>
-                  </a:schemeClr>
-                </a:solidFill>
-              </a:defRPr>
-            </a:lvl2pPr>
-            <a:lvl3pPr indent="0">
-              <a:lnSpc>
-                <a:spcPct val="150000"/>
-              </a:lnSpc>
-              <a:spcBef>
-                <a:spcPts val="500"/>
-              </a:spcBef>
-              <a:buFont typeface="Arial" panose="020B0604020202020204" pitchFamily="34" charset="0"/>
-              <a:buNone/>
-              <a:defRPr>
-                <a:solidFill>
-                  <a:schemeClr val="tx1">
-                    <a:tint val="75000"/>
-                  </a:schemeClr>
-                </a:solidFill>
-              </a:defRPr>
-            </a:lvl3pPr>
-            <a:lvl4pPr indent="0">
-              <a:lnSpc>
-                <a:spcPct val="150000"/>
-              </a:lnSpc>
-              <a:spcBef>
-                <a:spcPts val="500"/>
-              </a:spcBef>
-              <a:buFont typeface="Arial" panose="020B0604020202020204" pitchFamily="34" charset="0"/>
-              <a:buNone/>
-              <a:defRPr sz="1600">
-                <a:solidFill>
-                  <a:schemeClr val="tx1">
-                    <a:tint val="75000"/>
-                  </a:schemeClr>
-                </a:solidFill>
-              </a:defRPr>
-            </a:lvl4pPr>
-            <a:lvl5pPr indent="0">
-              <a:lnSpc>
-                <a:spcPct val="150000"/>
-              </a:lnSpc>
-              <a:spcBef>
-                <a:spcPts val="500"/>
-              </a:spcBef>
-              <a:buFont typeface="Arial" panose="020B0604020202020204" pitchFamily="34" charset="0"/>
-              <a:buNone/>
-              <a:defRPr sz="1600">
-                <a:solidFill>
-                  <a:schemeClr val="tx1">
-                    <a:tint val="75000"/>
-                  </a:schemeClr>
-                </a:solidFill>
-              </a:defRPr>
-            </a:lvl5pPr>
-            <a:lvl6pPr indent="0">
-              <a:lnSpc>
-                <a:spcPct val="90000"/>
-              </a:lnSpc>
-              <a:spcBef>
-                <a:spcPts val="500"/>
-              </a:spcBef>
-              <a:buFont typeface="Arial" panose="020B0604020202020204" pitchFamily="34" charset="0"/>
-              <a:buNone/>
-              <a:defRPr sz="1600">
-                <a:solidFill>
-                  <a:schemeClr val="tx1">
-                    <a:tint val="75000"/>
-                  </a:schemeClr>
-                </a:solidFill>
-              </a:defRPr>
-            </a:lvl6pPr>
-            <a:lvl7pPr indent="0">
-              <a:lnSpc>
-                <a:spcPct val="90000"/>
-              </a:lnSpc>
-              <a:spcBef>
-                <a:spcPts val="500"/>
-              </a:spcBef>
-              <a:buFont typeface="Arial" panose="020B0604020202020204" pitchFamily="34" charset="0"/>
-              <a:buNone/>
-              <a:defRPr sz="1600">
-                <a:solidFill>
-                  <a:schemeClr val="tx1">
-                    <a:tint val="75000"/>
-                  </a:schemeClr>
-                </a:solidFill>
-              </a:defRPr>
-            </a:lvl7pPr>
-            <a:lvl8pPr indent="0">
-              <a:lnSpc>
-                <a:spcPct val="90000"/>
-              </a:lnSpc>
-              <a:spcBef>
-                <a:spcPts val="500"/>
-              </a:spcBef>
-              <a:buFont typeface="Arial" panose="020B0604020202020204" pitchFamily="34" charset="0"/>
-              <a:buNone/>
-              <a:defRPr sz="1600">
-                <a:solidFill>
-                  <a:schemeClr val="tx1">
-                    <a:tint val="75000"/>
-                  </a:schemeClr>
-                </a:solidFill>
-              </a:defRPr>
-            </a:lvl8pPr>
-            <a:lvl9pPr indent="0">
-              <a:lnSpc>
-                <a:spcPct val="90000"/>
-              </a:lnSpc>
-              <a:spcBef>
-                <a:spcPts val="500"/>
-              </a:spcBef>
-              <a:buFont typeface="Arial" panose="020B0604020202020204" pitchFamily="34" charset="0"/>
-              <a:buNone/>
-              <a:defRPr sz="1600">
-                <a:solidFill>
-                  <a:schemeClr val="tx1">
-                    <a:tint val="75000"/>
-                  </a:schemeClr>
-                </a:solidFill>
-              </a:defRPr>
-            </a:lvl9pPr>
-          </a:lstStyle>
-          <a:p>
-            <a:pPr marL="342900" indent="-342900">
-              <a:spcBef>
-                <a:spcPts val="1200"/>
-              </a:spcBef>
-              <a:buFont typeface="Arial" panose="020B0604020202020204" pitchFamily="34" charset="0"/>
-              <a:buChar char="•"/>
-            </a:pPr>
-            <a:r>
-              <a:rPr lang="en-US" dirty="0"/>
-              <a:t>Landing page with account creation</a:t>
-            </a:r>
-          </a:p>
-          <a:p>
-            <a:pPr marL="342900" indent="-342900">
-              <a:spcBef>
-                <a:spcPts val="1200"/>
-              </a:spcBef>
-              <a:buFont typeface="Arial" panose="020B0604020202020204" pitchFamily="34" charset="0"/>
-              <a:buChar char="•"/>
-            </a:pPr>
-            <a:r>
-              <a:rPr lang="en-US" dirty="0"/>
-              <a:t>Picture upload screen</a:t>
-            </a:r>
-          </a:p>
-          <a:p>
-            <a:pPr marL="342900" indent="-342900">
-              <a:spcBef>
-                <a:spcPts val="1200"/>
-              </a:spcBef>
-              <a:buFont typeface="Arial" panose="020B0604020202020204" pitchFamily="34" charset="0"/>
-              <a:buChar char="•"/>
-            </a:pPr>
-            <a:r>
-              <a:rPr lang="en-US" dirty="0"/>
-              <a:t>Picture recognition response</a:t>
-            </a:r>
-          </a:p>
-          <a:p>
-            <a:pPr marL="342900" indent="-342900">
-              <a:spcBef>
-                <a:spcPts val="1200"/>
-              </a:spcBef>
-              <a:buFont typeface="Arial" panose="020B0604020202020204" pitchFamily="34" charset="0"/>
-              <a:buChar char="•"/>
-            </a:pPr>
-            <a:r>
-              <a:rPr lang="en-US" dirty="0"/>
-              <a:t>Name suggestions from designated databases based on the animal and obvious features</a:t>
-            </a:r>
-          </a:p>
-          <a:p>
-            <a:pPr marL="342900" indent="-342900">
-              <a:spcBef>
-                <a:spcPts val="1200"/>
-              </a:spcBef>
-              <a:buFont typeface="Arial" panose="020B0604020202020204" pitchFamily="34" charset="0"/>
-              <a:buChar char="•"/>
-            </a:pPr>
-            <a:r>
-              <a:rPr lang="en-US" dirty="0"/>
-              <a:t>Ability to save favorite names to account database</a:t>
-            </a:r>
-          </a:p>
-        </p:txBody>
-      </p:sp>
-      <p:pic>
-        <p:nvPicPr>
-          <p:cNvPr id="4" name="Picture Placeholder 7" descr="close up of computer code">
-            <a:extLst>
-              <a:ext uri="{FF2B5EF4-FFF2-40B4-BE49-F238E27FC236}">
-                <a16:creationId xmlns:a16="http://schemas.microsoft.com/office/drawing/2014/main" id="{EFC42499-7A07-6EF5-2A4A-AD93E002BC94}"/>
-              </a:ext>
-            </a:extLst>
-          </p:cNvPr>
-          <p:cNvPicPr>
-            <a:picLocks noChangeAspect="1"/>
-          </p:cNvPicPr>
-          <p:nvPr/>
-        </p:nvPicPr>
-        <p:blipFill rotWithShape="1">
-          <a:blip r:embed="rId2">
-            <a:extLst>
-              <a:ext uri="{BEBA8EAE-BF5A-486C-A8C5-ECC9F3942E4B}">
-                <a14:imgProps xmlns:a14="http://schemas.microsoft.com/office/drawing/2010/main">
-                  <a14:imgLayer r:embed="rId3">
-                    <a14:imgEffect>
-                      <a14:saturation sat="0"/>
-                    </a14:imgEffect>
-                  </a14:imgLayer>
-                </a14:imgProps>
-              </a:ext>
-            </a:extLst>
-          </a:blip>
-          <a:srcRect l="20370" r="20370"/>
-          <a:stretch/>
-        </p:blipFill>
-        <p:spPr>
-          <a:xfrm>
-            <a:off x="0" y="0"/>
-            <a:ext cx="6096000" cy="6867922"/>
-          </a:xfrm>
-          <a:custGeom>
-            <a:avLst/>
-            <a:gdLst>
-              <a:gd name="connsiteX0" fmla="*/ 0 w 6096000"/>
-              <a:gd name="connsiteY0" fmla="*/ 0 h 6858000"/>
-              <a:gd name="connsiteX1" fmla="*/ 6096000 w 6096000"/>
-              <a:gd name="connsiteY1" fmla="*/ 0 h 6858000"/>
-              <a:gd name="connsiteX2" fmla="*/ 6096000 w 6096000"/>
-              <a:gd name="connsiteY2" fmla="*/ 6858000 h 6858000"/>
-              <a:gd name="connsiteX3" fmla="*/ 0 w 6096000"/>
-              <a:gd name="connsiteY3" fmla="*/ 6858000 h 6858000"/>
-              <a:gd name="connsiteX4" fmla="*/ 0 w 6096000"/>
-              <a:gd name="connsiteY4" fmla="*/ 0 h 6858000"/>
-              <a:gd name="connsiteX0" fmla="*/ 0 w 6096000"/>
-              <a:gd name="connsiteY0" fmla="*/ 0 h 6858000"/>
-              <a:gd name="connsiteX1" fmla="*/ 6096000 w 6096000"/>
-              <a:gd name="connsiteY1" fmla="*/ 0 h 6858000"/>
-              <a:gd name="connsiteX2" fmla="*/ 4242487 w 6096000"/>
-              <a:gd name="connsiteY2" fmla="*/ 6833286 h 6858000"/>
-              <a:gd name="connsiteX3" fmla="*/ 0 w 6096000"/>
-              <a:gd name="connsiteY3" fmla="*/ 6858000 h 6858000"/>
-              <a:gd name="connsiteX4" fmla="*/ 0 w 6096000"/>
-              <a:gd name="connsiteY4" fmla="*/ 0 h 6858000"/>
-              <a:gd name="connsiteX0" fmla="*/ 0 w 6096000"/>
-              <a:gd name="connsiteY0" fmla="*/ 0 h 6867922"/>
-              <a:gd name="connsiteX1" fmla="*/ 6096000 w 6096000"/>
-              <a:gd name="connsiteY1" fmla="*/ 0 h 6867922"/>
-              <a:gd name="connsiteX2" fmla="*/ 4228633 w 6096000"/>
-              <a:gd name="connsiteY2" fmla="*/ 6867922 h 6867922"/>
-              <a:gd name="connsiteX3" fmla="*/ 0 w 6096000"/>
-              <a:gd name="connsiteY3" fmla="*/ 6858000 h 6867922"/>
-              <a:gd name="connsiteX4" fmla="*/ 0 w 6096000"/>
-              <a:gd name="connsiteY4" fmla="*/ 0 h 6867922"/>
-            </a:gdLst>
-            <a:ahLst/>
-            <a:cxnLst>
-              <a:cxn ang="0">
-                <a:pos x="connsiteX0" y="connsiteY0"/>
-              </a:cxn>
-              <a:cxn ang="0">
-                <a:pos x="connsiteX1" y="connsiteY1"/>
-              </a:cxn>
-              <a:cxn ang="0">
-                <a:pos x="connsiteX2" y="connsiteY2"/>
-              </a:cxn>
-              <a:cxn ang="0">
-                <a:pos x="connsiteX3" y="connsiteY3"/>
-              </a:cxn>
-              <a:cxn ang="0">
-                <a:pos x="connsiteX4" y="connsiteY4"/>
-              </a:cxn>
-            </a:cxnLst>
-            <a:rect l="l" t="t" r="r" b="b"/>
-            <a:pathLst>
-              <a:path w="6096000" h="6867922">
-                <a:moveTo>
-                  <a:pt x="0" y="0"/>
-                </a:moveTo>
-                <a:lnTo>
-                  <a:pt x="6096000" y="0"/>
-                </a:lnTo>
-                <a:lnTo>
-                  <a:pt x="4228633" y="6867922"/>
-                </a:lnTo>
-                <a:lnTo>
-                  <a:pt x="0" y="6858000"/>
-                </a:lnTo>
-                <a:lnTo>
-                  <a:pt x="0" y="0"/>
-                </a:lnTo>
-                <a:close/>
-              </a:path>
-            </a:pathLst>
-          </a:custGeom>
-          <a:effectLst/>
-        </p:spPr>
-      </p:pic>
-    </p:spTree>
-    <p:extLst>
-      <p:ext uri="{BB962C8B-B14F-4D97-AF65-F5344CB8AC3E}">
-        <p14:creationId xmlns:p14="http://schemas.microsoft.com/office/powerpoint/2010/main" val="4094892012"/>
-      </p:ext>
-    </p:extLst>
-  </p:cSld>
-  <p:clrMapOvr>
-    <a:masterClrMapping/>
-  </p:clrMapOvr>
-</p:sld>
-</file>
-
-<file path=ppt/slides/slide6.xml><?xml version="1.0" encoding="utf-8"?>
-<p:sld xmlns:a="http://schemas.openxmlformats.org/drawingml/2006/main" xmlns:r="http://schemas.openxmlformats.org/officeDocument/2006/relationships" xmlns:p="http://schemas.openxmlformats.org/presentationml/2006/main">
-  <p:cSld>
-    <p:spTree>
-      <p:nvGrpSpPr>
-        <p:cNvPr id="1" name=""/>
-        <p:cNvGrpSpPr/>
-        <p:nvPr/>
-      </p:nvGrpSpPr>
-      <p:grpSpPr>
-        <a:xfrm>
-          <a:off x="0" y="0"/>
-          <a:ext cx="0" cy="0"/>
-          <a:chOff x="0" y="0"/>
-          <a:chExt cx="0" cy="0"/>
-        </a:xfrm>
-      </p:grpSpPr>
-      <p:pic>
-        <p:nvPicPr>
-          <p:cNvPr id="9" name="Picture Placeholder 7" descr="abstract image">
-            <a:extLst>
-              <a:ext uri="{FF2B5EF4-FFF2-40B4-BE49-F238E27FC236}">
-                <a16:creationId xmlns:a16="http://schemas.microsoft.com/office/drawing/2014/main" id="{10C261F5-27E5-A8D9-57BF-8DCB0A00F6B1}"/>
-              </a:ext>
-            </a:extLst>
-          </p:cNvPr>
-          <p:cNvPicPr>
-            <a:picLocks noChangeAspect="1"/>
-          </p:cNvPicPr>
-          <p:nvPr/>
-        </p:nvPicPr>
-        <p:blipFill rotWithShape="1">
-          <a:blip r:embed="rId2">
-            <a:alphaModFix/>
-            <a:extLst>
-              <a:ext uri="{BEBA8EAE-BF5A-486C-A8C5-ECC9F3942E4B}">
-                <a14:imgProps xmlns:a14="http://schemas.microsoft.com/office/drawing/2010/main">
-                  <a14:imgLayer r:embed="rId3">
-                    <a14:imgEffect>
-                      <a14:saturation sat="0"/>
-                    </a14:imgEffect>
-                  </a14:imgLayer>
-                </a14:imgProps>
-              </a:ext>
-            </a:extLst>
-          </a:blip>
-          <a:srcRect l="18261" r="36813"/>
-          <a:stretch/>
-        </p:blipFill>
-        <p:spPr>
-          <a:xfrm>
-            <a:off x="-1" y="0"/>
-            <a:ext cx="5477523" cy="6858000"/>
-          </a:xfrm>
-          <a:prstGeom prst="rect">
-            <a:avLst/>
-          </a:prstGeom>
-        </p:spPr>
-      </p:pic>
-      <p:sp>
-        <p:nvSpPr>
-          <p:cNvPr id="3" name="Title 2">
-            <a:extLst>
-              <a:ext uri="{FF2B5EF4-FFF2-40B4-BE49-F238E27FC236}">
-                <a16:creationId xmlns:a16="http://schemas.microsoft.com/office/drawing/2014/main" id="{1D24B42B-925B-494C-A986-BD85E8117E1E}"/>
-              </a:ext>
-            </a:extLst>
-          </p:cNvPr>
-          <p:cNvSpPr>
-            <a:spLocks noGrp="1"/>
-          </p:cNvSpPr>
-          <p:nvPr>
-            <p:ph type="title"/>
-          </p:nvPr>
-        </p:nvSpPr>
-        <p:spPr>
-          <a:xfrm>
-            <a:off x="6362330" y="411225"/>
-            <a:ext cx="5251450" cy="956373"/>
-          </a:xfrm>
-        </p:spPr>
-        <p:txBody>
-          <a:bodyPr anchor="t">
-            <a:normAutofit fontScale="90000"/>
-          </a:bodyPr>
-          <a:lstStyle/>
-          <a:p>
-            <a:r>
-              <a:rPr lang="en-US" sz="4800" dirty="0"/>
-              <a:t>Frontend</a:t>
-            </a:r>
-            <a:br>
-              <a:rPr lang="en-US" sz="4800" dirty="0"/>
-            </a:br>
-            <a:r>
-              <a:rPr lang="en-US" sz="4800" dirty="0"/>
-              <a:t>technology</a:t>
-            </a:r>
-          </a:p>
-        </p:txBody>
-      </p:sp>
-      <p:sp>
-        <p:nvSpPr>
-          <p:cNvPr id="5" name="Text Placeholder 4">
-            <a:extLst>
-              <a:ext uri="{FF2B5EF4-FFF2-40B4-BE49-F238E27FC236}">
-                <a16:creationId xmlns:a16="http://schemas.microsoft.com/office/drawing/2014/main" id="{AF9B872F-6332-408E-9135-B871F0C90C00}"/>
-              </a:ext>
-            </a:extLst>
-          </p:cNvPr>
-          <p:cNvSpPr>
-            <a:spLocks noGrp="1"/>
-          </p:cNvSpPr>
-          <p:nvPr>
-            <p:ph type="body" idx="1"/>
-          </p:nvPr>
-        </p:nvSpPr>
-        <p:spPr>
-          <a:xfrm>
-            <a:off x="6362330" y="2025552"/>
-            <a:ext cx="5829669" cy="365125"/>
-          </a:xfrm>
-        </p:spPr>
-        <p:txBody>
-          <a:bodyPr/>
-          <a:lstStyle/>
-          <a:p>
-            <a:r>
-              <a:rPr lang="en-US" spc="300" dirty="0"/>
-              <a:t> </a:t>
-            </a:r>
-          </a:p>
-        </p:txBody>
-      </p:sp>
-      <p:sp>
-        <p:nvSpPr>
-          <p:cNvPr id="2" name="Slide Number Placeholder 1">
-            <a:extLst>
-              <a:ext uri="{FF2B5EF4-FFF2-40B4-BE49-F238E27FC236}">
-                <a16:creationId xmlns:a16="http://schemas.microsoft.com/office/drawing/2014/main" id="{948DD8A0-BD53-4DBF-949B-0D64D12DADA9}"/>
-              </a:ext>
-            </a:extLst>
-          </p:cNvPr>
-          <p:cNvSpPr>
-            <a:spLocks noGrp="1"/>
-          </p:cNvSpPr>
-          <p:nvPr>
-            <p:ph type="sldNum" sz="quarter" idx="12"/>
-          </p:nvPr>
-        </p:nvSpPr>
-        <p:spPr/>
-        <p:txBody>
-          <a:bodyPr/>
-          <a:lstStyle/>
-          <a:p>
-            <a:fld id="{8C2E478F-E849-4A8C-AF1F-CBCC78A7CBFA}" type="slidenum">
-              <a:rPr lang="en-US" smtClean="0"/>
-              <a:t>6</a:t>
-            </a:fld>
-            <a:endParaRPr lang="en-US" dirty="0"/>
-          </a:p>
-        </p:txBody>
-      </p:sp>
-      <p:sp>
-        <p:nvSpPr>
-          <p:cNvPr id="6" name="Content Placeholder 8">
-            <a:extLst>
-              <a:ext uri="{FF2B5EF4-FFF2-40B4-BE49-F238E27FC236}">
-                <a16:creationId xmlns:a16="http://schemas.microsoft.com/office/drawing/2014/main" id="{3B4F2E0F-78BC-2FE8-4808-2A26179B55EA}"/>
-              </a:ext>
-            </a:extLst>
-          </p:cNvPr>
-          <p:cNvSpPr txBox="1">
-            <a:spLocks/>
-          </p:cNvSpPr>
-          <p:nvPr/>
-        </p:nvSpPr>
-        <p:spPr>
-          <a:xfrm>
-            <a:off x="6362330" y="2574543"/>
-            <a:ext cx="4646246" cy="3038482"/>
           </a:xfrm>
           <a:prstGeom prst="rect">
             <a:avLst/>
@@ -7568,71 +7027,175 @@
           </a:lstStyle>
           <a:p>
             <a:pPr marL="342900" indent="-342900">
+              <a:spcBef>
+                <a:spcPts val="1200"/>
+              </a:spcBef>
               <a:buFont typeface="Arial" panose="020B0604020202020204" pitchFamily="34" charset="0"/>
               <a:buChar char="•"/>
             </a:pPr>
             <a:r>
-              <a:rPr lang="en-US" dirty="0" err="1"/>
-              <a:t>VSCode</a:t>
-            </a:r>
-            <a:r>
               <a:rPr lang="en-US" dirty="0"/>
-              <a:t> IDE</a:t>
+              <a:t>Landing page with account creation</a:t>
             </a:r>
           </a:p>
           <a:p>
             <a:pPr marL="342900" indent="-342900">
+              <a:spcBef>
+                <a:spcPts val="1200"/>
+              </a:spcBef>
               <a:buFont typeface="Arial" panose="020B0604020202020204" pitchFamily="34" charset="0"/>
               <a:buChar char="•"/>
             </a:pPr>
             <a:r>
               <a:rPr lang="en-US" dirty="0"/>
-              <a:t>Vue</a:t>
+              <a:t>Picture upload screen</a:t>
             </a:r>
           </a:p>
           <a:p>
             <a:pPr marL="342900" indent="-342900">
+              <a:spcBef>
+                <a:spcPts val="1200"/>
+              </a:spcBef>
               <a:buFont typeface="Arial" panose="020B0604020202020204" pitchFamily="34" charset="0"/>
               <a:buChar char="•"/>
             </a:pPr>
             <a:r>
               <a:rPr lang="en-US" dirty="0"/>
-              <a:t>HTML</a:t>
+              <a:t>Picture recognition response</a:t>
             </a:r>
           </a:p>
           <a:p>
             <a:pPr marL="342900" indent="-342900">
+              <a:spcBef>
+                <a:spcPts val="1200"/>
+              </a:spcBef>
               <a:buFont typeface="Arial" panose="020B0604020202020204" pitchFamily="34" charset="0"/>
               <a:buChar char="•"/>
             </a:pPr>
             <a:r>
               <a:rPr lang="en-US" dirty="0"/>
-              <a:t>CSS</a:t>
-            </a:r>
-          </a:p>
-          <a:p>
-            <a:pPr marL="342900" indent="-342900">
-              <a:buFont typeface="Arial" panose="020B0604020202020204" pitchFamily="34" charset="0"/>
-              <a:buChar char="•"/>
-            </a:pPr>
-            <a:r>
-              <a:rPr lang="en-US" dirty="0"/>
-              <a:t>JavaScript</a:t>
-            </a:r>
-          </a:p>
-          <a:p>
-            <a:pPr marL="342900" indent="-342900">
-              <a:buFont typeface="Arial" panose="020B0604020202020204" pitchFamily="34" charset="0"/>
-              <a:buChar char="•"/>
-            </a:pPr>
-            <a:endParaRPr lang="en-US" dirty="0"/>
-          </a:p>
-        </p:txBody>
-      </p:sp>
+              <a:t>Name suggestions from designated databases based on the animal and obvious features</a:t>
+            </a:r>
+          </a:p>
+        </p:txBody>
+      </p:sp>
+      <p:pic>
+        <p:nvPicPr>
+          <p:cNvPr id="4" name="Picture Placeholder 7" descr="close up of computer code">
+            <a:extLst>
+              <a:ext uri="{FF2B5EF4-FFF2-40B4-BE49-F238E27FC236}">
+                <a16:creationId xmlns:a16="http://schemas.microsoft.com/office/drawing/2014/main" id="{EFC42499-7A07-6EF5-2A4A-AD93E002BC94}"/>
+              </a:ext>
+            </a:extLst>
+          </p:cNvPr>
+          <p:cNvPicPr>
+            <a:picLocks noChangeAspect="1"/>
+          </p:cNvPicPr>
+          <p:nvPr/>
+        </p:nvPicPr>
+        <p:blipFill rotWithShape="1">
+          <a:blip r:embed="rId2">
+            <a:extLst>
+              <a:ext uri="{BEBA8EAE-BF5A-486C-A8C5-ECC9F3942E4B}">
+                <a14:imgProps xmlns:a14="http://schemas.microsoft.com/office/drawing/2010/main">
+                  <a14:imgLayer r:embed="rId3">
+                    <a14:imgEffect>
+                      <a14:saturation sat="0"/>
+                    </a14:imgEffect>
+                  </a14:imgLayer>
+                </a14:imgProps>
+              </a:ext>
+            </a:extLst>
+          </a:blip>
+          <a:srcRect l="20370" r="20370"/>
+          <a:stretch/>
+        </p:blipFill>
+        <p:spPr>
+          <a:xfrm>
+            <a:off x="0" y="0"/>
+            <a:ext cx="6096000" cy="6867922"/>
+          </a:xfrm>
+          <a:custGeom>
+            <a:avLst/>
+            <a:gdLst>
+              <a:gd name="connsiteX0" fmla="*/ 0 w 6096000"/>
+              <a:gd name="connsiteY0" fmla="*/ 0 h 6858000"/>
+              <a:gd name="connsiteX1" fmla="*/ 6096000 w 6096000"/>
+              <a:gd name="connsiteY1" fmla="*/ 0 h 6858000"/>
+              <a:gd name="connsiteX2" fmla="*/ 6096000 w 6096000"/>
+              <a:gd name="connsiteY2" fmla="*/ 6858000 h 6858000"/>
+              <a:gd name="connsiteX3" fmla="*/ 0 w 6096000"/>
+              <a:gd name="connsiteY3" fmla="*/ 6858000 h 6858000"/>
+              <a:gd name="connsiteX4" fmla="*/ 0 w 6096000"/>
+              <a:gd name="connsiteY4" fmla="*/ 0 h 6858000"/>
+              <a:gd name="connsiteX0" fmla="*/ 0 w 6096000"/>
+              <a:gd name="connsiteY0" fmla="*/ 0 h 6858000"/>
+              <a:gd name="connsiteX1" fmla="*/ 6096000 w 6096000"/>
+              <a:gd name="connsiteY1" fmla="*/ 0 h 6858000"/>
+              <a:gd name="connsiteX2" fmla="*/ 4242487 w 6096000"/>
+              <a:gd name="connsiteY2" fmla="*/ 6833286 h 6858000"/>
+              <a:gd name="connsiteX3" fmla="*/ 0 w 6096000"/>
+              <a:gd name="connsiteY3" fmla="*/ 6858000 h 6858000"/>
+              <a:gd name="connsiteX4" fmla="*/ 0 w 6096000"/>
+              <a:gd name="connsiteY4" fmla="*/ 0 h 6858000"/>
+              <a:gd name="connsiteX0" fmla="*/ 0 w 6096000"/>
+              <a:gd name="connsiteY0" fmla="*/ 0 h 6867922"/>
+              <a:gd name="connsiteX1" fmla="*/ 6096000 w 6096000"/>
+              <a:gd name="connsiteY1" fmla="*/ 0 h 6867922"/>
+              <a:gd name="connsiteX2" fmla="*/ 4228633 w 6096000"/>
+              <a:gd name="connsiteY2" fmla="*/ 6867922 h 6867922"/>
+              <a:gd name="connsiteX3" fmla="*/ 0 w 6096000"/>
+              <a:gd name="connsiteY3" fmla="*/ 6858000 h 6867922"/>
+              <a:gd name="connsiteX4" fmla="*/ 0 w 6096000"/>
+              <a:gd name="connsiteY4" fmla="*/ 0 h 6867922"/>
+            </a:gdLst>
+            <a:ahLst/>
+            <a:cxnLst>
+              <a:cxn ang="0">
+                <a:pos x="connsiteX0" y="connsiteY0"/>
+              </a:cxn>
+              <a:cxn ang="0">
+                <a:pos x="connsiteX1" y="connsiteY1"/>
+              </a:cxn>
+              <a:cxn ang="0">
+                <a:pos x="connsiteX2" y="connsiteY2"/>
+              </a:cxn>
+              <a:cxn ang="0">
+                <a:pos x="connsiteX3" y="connsiteY3"/>
+              </a:cxn>
+              <a:cxn ang="0">
+                <a:pos x="connsiteX4" y="connsiteY4"/>
+              </a:cxn>
+            </a:cxnLst>
+            <a:rect l="l" t="t" r="r" b="b"/>
+            <a:pathLst>
+              <a:path w="6096000" h="6867922">
+                <a:moveTo>
+                  <a:pt x="0" y="0"/>
+                </a:moveTo>
+                <a:lnTo>
+                  <a:pt x="6096000" y="0"/>
+                </a:lnTo>
+                <a:lnTo>
+                  <a:pt x="4228633" y="6867922"/>
+                </a:lnTo>
+                <a:lnTo>
+                  <a:pt x="0" y="6858000"/>
+                </a:lnTo>
+                <a:lnTo>
+                  <a:pt x="0" y="0"/>
+                </a:lnTo>
+                <a:close/>
+              </a:path>
+            </a:pathLst>
+          </a:custGeom>
+          <a:effectLst/>
+        </p:spPr>
+      </p:pic>
     </p:spTree>
     <p:extLst>
       <p:ext uri="{BB962C8B-B14F-4D97-AF65-F5344CB8AC3E}">
-        <p14:creationId xmlns:p14="http://schemas.microsoft.com/office/powerpoint/2010/main" val="3164405530"/>
+        <p14:creationId xmlns:p14="http://schemas.microsoft.com/office/powerpoint/2010/main" val="4094892012"/>
       </p:ext>
     </p:extLst>
   </p:cSld>
@@ -7642,7 +7205,7 @@
 </p:sld>
 </file>
 
-<file path=ppt/slides/slide7.xml><?xml version="1.0" encoding="utf-8"?>
+<file path=ppt/slides/slide6.xml><?xml version="1.0" encoding="utf-8"?>
 <p:sld xmlns:a="http://schemas.openxmlformats.org/drawingml/2006/main" xmlns:r="http://schemas.openxmlformats.org/officeDocument/2006/relationships" xmlns:p="http://schemas.openxmlformats.org/presentationml/2006/main">
   <p:cSld>
     <p:spTree>
@@ -7688,7 +7251,7 @@
               </a:ext>
             </a:extLst>
           </a:blip>
-          <a:srcRect l="54869" r="205"/>
+          <a:srcRect l="18261" r="36813"/>
           <a:stretch/>
         </p:blipFill>
         <p:spPr>
@@ -7731,7 +7294,7 @@
           <a:p>
             <a:r>
               <a:rPr lang="en-US" sz="4800" dirty="0"/>
-              <a:t>backend</a:t>
+              <a:t>Frontend</a:t>
             </a:r>
             <a:br>
               <a:rPr lang="en-US" sz="4800" dirty="0"/>
@@ -7799,7 +7362,7 @@
           <a:p>
             <a:fld id="{8C2E478F-E849-4A8C-AF1F-CBCC78A7CBFA}" type="slidenum">
               <a:rPr lang="en-US" smtClean="0"/>
-              <a:t>7</a:t>
+              <a:t>6</a:t>
             </a:fld>
             <a:endParaRPr lang="en-US" dirty="0"/>
           </a:p>
@@ -7996,12 +7559,8 @@
               <a:buChar char="•"/>
             </a:pPr>
             <a:r>
-              <a:rPr lang="en-US" dirty="0" err="1"/>
-              <a:t>VSCode</a:t>
-            </a:r>
-            <a:r>
               <a:rPr lang="en-US" dirty="0"/>
-              <a:t> IDE</a:t>
+              <a:t>HTML</a:t>
             </a:r>
           </a:p>
           <a:p>
@@ -8011,7 +7570,7 @@
             </a:pPr>
             <a:r>
               <a:rPr lang="en-US" dirty="0"/>
-              <a:t>Python 3.11.8</a:t>
+              <a:t>CSS</a:t>
             </a:r>
           </a:p>
           <a:p>
@@ -8020,26 +7579,410 @@
               <a:buChar char="•"/>
             </a:pPr>
             <a:r>
-              <a:rPr lang="en-US" dirty="0"/>
-              <a:t>Django</a:t>
-            </a:r>
-          </a:p>
+              <a:rPr lang="en-US"/>
+              <a:t>Python 3.11.8</a:t>
+            </a:r>
+            <a:endParaRPr lang="en-US" dirty="0"/>
+          </a:p>
+          <a:p>
+            <a:endParaRPr lang="en-US" dirty="0"/>
+          </a:p>
+        </p:txBody>
+      </p:sp>
+    </p:spTree>
+    <p:extLst>
+      <p:ext uri="{BB962C8B-B14F-4D97-AF65-F5344CB8AC3E}">
+        <p14:creationId xmlns:p14="http://schemas.microsoft.com/office/powerpoint/2010/main" val="3164405530"/>
+      </p:ext>
+    </p:extLst>
+  </p:cSld>
+  <p:clrMapOvr>
+    <a:masterClrMapping/>
+  </p:clrMapOvr>
+</p:sld>
+</file>
+
+<file path=ppt/slides/slide7.xml><?xml version="1.0" encoding="utf-8"?>
+<p:sld xmlns:a="http://schemas.openxmlformats.org/drawingml/2006/main" xmlns:r="http://schemas.openxmlformats.org/officeDocument/2006/relationships" xmlns:p="http://schemas.openxmlformats.org/presentationml/2006/main">
+  <p:cSld>
+    <p:spTree>
+      <p:nvGrpSpPr>
+        <p:cNvPr id="1" name=""/>
+        <p:cNvGrpSpPr/>
+        <p:nvPr/>
+      </p:nvGrpSpPr>
+      <p:grpSpPr>
+        <a:xfrm>
+          <a:off x="0" y="0"/>
+          <a:ext cx="0" cy="0"/>
+          <a:chOff x="0" y="0"/>
+          <a:chExt cx="0" cy="0"/>
+        </a:xfrm>
+      </p:grpSpPr>
+      <p:pic>
+        <p:nvPicPr>
+          <p:cNvPr id="9" name="Picture Placeholder 7" descr="abstract image">
+            <a:extLst>
+              <a:ext uri="{FF2B5EF4-FFF2-40B4-BE49-F238E27FC236}">
+                <a16:creationId xmlns:a16="http://schemas.microsoft.com/office/drawing/2014/main" id="{10C261F5-27E5-A8D9-57BF-8DCB0A00F6B1}"/>
+              </a:ext>
+            </a:extLst>
+          </p:cNvPr>
+          <p:cNvPicPr>
+            <a:picLocks noChangeAspect="1"/>
+          </p:cNvPicPr>
+          <p:nvPr/>
+        </p:nvPicPr>
+        <p:blipFill rotWithShape="1">
+          <a:blip r:embed="rId2">
+            <a:alphaModFix/>
+            <a:extLst>
+              <a:ext uri="{BEBA8EAE-BF5A-486C-A8C5-ECC9F3942E4B}">
+                <a14:imgProps xmlns:a14="http://schemas.microsoft.com/office/drawing/2010/main">
+                  <a14:imgLayer r:embed="rId3">
+                    <a14:imgEffect>
+                      <a14:saturation sat="0"/>
+                    </a14:imgEffect>
+                  </a14:imgLayer>
+                </a14:imgProps>
+              </a:ext>
+            </a:extLst>
+          </a:blip>
+          <a:srcRect l="54869" r="205"/>
+          <a:stretch/>
+        </p:blipFill>
+        <p:spPr>
+          <a:xfrm>
+            <a:off x="-1" y="0"/>
+            <a:ext cx="5477523" cy="6858000"/>
+          </a:xfrm>
+          <a:prstGeom prst="rect">
+            <a:avLst/>
+          </a:prstGeom>
+        </p:spPr>
+      </p:pic>
+      <p:sp>
+        <p:nvSpPr>
+          <p:cNvPr id="3" name="Title 2">
+            <a:extLst>
+              <a:ext uri="{FF2B5EF4-FFF2-40B4-BE49-F238E27FC236}">
+                <a16:creationId xmlns:a16="http://schemas.microsoft.com/office/drawing/2014/main" id="{1D24B42B-925B-494C-A986-BD85E8117E1E}"/>
+              </a:ext>
+            </a:extLst>
+          </p:cNvPr>
+          <p:cNvSpPr>
+            <a:spLocks noGrp="1"/>
+          </p:cNvSpPr>
+          <p:nvPr>
+            <p:ph type="title"/>
+          </p:nvPr>
+        </p:nvSpPr>
+        <p:spPr>
+          <a:xfrm>
+            <a:off x="6362330" y="411225"/>
+            <a:ext cx="5251450" cy="956373"/>
+          </a:xfrm>
+        </p:spPr>
+        <p:txBody>
+          <a:bodyPr anchor="t">
+            <a:normAutofit fontScale="90000"/>
+          </a:bodyPr>
+          <a:lstStyle/>
+          <a:p>
+            <a:r>
+              <a:rPr lang="en-US" sz="4800" dirty="0"/>
+              <a:t>backend</a:t>
+            </a:r>
+            <a:br>
+              <a:rPr lang="en-US" sz="4800" dirty="0"/>
+            </a:br>
+            <a:r>
+              <a:rPr lang="en-US" sz="4800" dirty="0"/>
+              <a:t>technology</a:t>
+            </a:r>
+          </a:p>
+        </p:txBody>
+      </p:sp>
+      <p:sp>
+        <p:nvSpPr>
+          <p:cNvPr id="5" name="Text Placeholder 4">
+            <a:extLst>
+              <a:ext uri="{FF2B5EF4-FFF2-40B4-BE49-F238E27FC236}">
+                <a16:creationId xmlns:a16="http://schemas.microsoft.com/office/drawing/2014/main" id="{AF9B872F-6332-408E-9135-B871F0C90C00}"/>
+              </a:ext>
+            </a:extLst>
+          </p:cNvPr>
+          <p:cNvSpPr>
+            <a:spLocks noGrp="1"/>
+          </p:cNvSpPr>
+          <p:nvPr>
+            <p:ph type="body" idx="1"/>
+          </p:nvPr>
+        </p:nvSpPr>
+        <p:spPr>
+          <a:xfrm>
+            <a:off x="6362330" y="2025552"/>
+            <a:ext cx="5829669" cy="365125"/>
+          </a:xfrm>
+        </p:spPr>
+        <p:txBody>
+          <a:bodyPr/>
+          <a:lstStyle/>
+          <a:p>
+            <a:r>
+              <a:rPr lang="en-US" spc="300" dirty="0"/>
+              <a:t> </a:t>
+            </a:r>
+          </a:p>
+        </p:txBody>
+      </p:sp>
+      <p:sp>
+        <p:nvSpPr>
+          <p:cNvPr id="2" name="Slide Number Placeholder 1">
+            <a:extLst>
+              <a:ext uri="{FF2B5EF4-FFF2-40B4-BE49-F238E27FC236}">
+                <a16:creationId xmlns:a16="http://schemas.microsoft.com/office/drawing/2014/main" id="{948DD8A0-BD53-4DBF-949B-0D64D12DADA9}"/>
+              </a:ext>
+            </a:extLst>
+          </p:cNvPr>
+          <p:cNvSpPr>
+            <a:spLocks noGrp="1"/>
+          </p:cNvSpPr>
+          <p:nvPr>
+            <p:ph type="sldNum" sz="quarter" idx="12"/>
+          </p:nvPr>
+        </p:nvSpPr>
+        <p:spPr/>
+        <p:txBody>
+          <a:bodyPr/>
+          <a:lstStyle/>
+          <a:p>
+            <a:fld id="{8C2E478F-E849-4A8C-AF1F-CBCC78A7CBFA}" type="slidenum">
+              <a:rPr lang="en-US" smtClean="0"/>
+              <a:t>7</a:t>
+            </a:fld>
+            <a:endParaRPr lang="en-US" dirty="0"/>
+          </a:p>
+        </p:txBody>
+      </p:sp>
+      <p:sp>
+        <p:nvSpPr>
+          <p:cNvPr id="6" name="Content Placeholder 8">
+            <a:extLst>
+              <a:ext uri="{FF2B5EF4-FFF2-40B4-BE49-F238E27FC236}">
+                <a16:creationId xmlns:a16="http://schemas.microsoft.com/office/drawing/2014/main" id="{3B4F2E0F-78BC-2FE8-4808-2A26179B55EA}"/>
+              </a:ext>
+            </a:extLst>
+          </p:cNvPr>
+          <p:cNvSpPr txBox="1">
+            <a:spLocks/>
+          </p:cNvSpPr>
+          <p:nvPr/>
+        </p:nvSpPr>
+        <p:spPr>
+          <a:xfrm>
+            <a:off x="6362330" y="2574543"/>
+            <a:ext cx="4646246" cy="3038482"/>
+          </a:xfrm>
+          <a:prstGeom prst="rect">
+            <a:avLst/>
+          </a:prstGeom>
+          <a:noFill/>
+        </p:spPr>
+        <p:txBody>
+          <a:bodyPr vert="horz" lIns="91440" tIns="45720" rIns="91440" bIns="45720" rtlCol="0" anchor="t">
+            <a:normAutofit/>
+          </a:bodyPr>
+          <a:lstStyle>
+            <a:defPPr>
+              <a:defRPr lang="en-US"/>
+            </a:defPPr>
+            <a:lvl1pPr indent="0">
+              <a:lnSpc>
+                <a:spcPct val="120000"/>
+              </a:lnSpc>
+              <a:spcBef>
+                <a:spcPts val="0"/>
+              </a:spcBef>
+              <a:buFont typeface="Arial" panose="020B0604020202020204" pitchFamily="34" charset="0"/>
+              <a:buNone/>
+              <a:defRPr sz="2400" cap="none" spc="0" baseline="0">
+                <a:solidFill>
+                  <a:sysClr val="windowText" lastClr="000000"/>
+                </a:solidFill>
+                <a:effectLst/>
+              </a:defRPr>
+            </a:lvl1pPr>
+            <a:lvl2pPr indent="0">
+              <a:lnSpc>
+                <a:spcPct val="150000"/>
+              </a:lnSpc>
+              <a:spcBef>
+                <a:spcPts val="500"/>
+              </a:spcBef>
+              <a:buFont typeface="Arial" panose="020B0604020202020204" pitchFamily="34" charset="0"/>
+              <a:buNone/>
+              <a:defRPr sz="2000">
+                <a:solidFill>
+                  <a:schemeClr val="tx1">
+                    <a:tint val="75000"/>
+                  </a:schemeClr>
+                </a:solidFill>
+              </a:defRPr>
+            </a:lvl2pPr>
+            <a:lvl3pPr indent="0">
+              <a:lnSpc>
+                <a:spcPct val="150000"/>
+              </a:lnSpc>
+              <a:spcBef>
+                <a:spcPts val="500"/>
+              </a:spcBef>
+              <a:buFont typeface="Arial" panose="020B0604020202020204" pitchFamily="34" charset="0"/>
+              <a:buNone/>
+              <a:defRPr>
+                <a:solidFill>
+                  <a:schemeClr val="tx1">
+                    <a:tint val="75000"/>
+                  </a:schemeClr>
+                </a:solidFill>
+              </a:defRPr>
+            </a:lvl3pPr>
+            <a:lvl4pPr indent="0">
+              <a:lnSpc>
+                <a:spcPct val="150000"/>
+              </a:lnSpc>
+              <a:spcBef>
+                <a:spcPts val="500"/>
+              </a:spcBef>
+              <a:buFont typeface="Arial" panose="020B0604020202020204" pitchFamily="34" charset="0"/>
+              <a:buNone/>
+              <a:defRPr sz="1600">
+                <a:solidFill>
+                  <a:schemeClr val="tx1">
+                    <a:tint val="75000"/>
+                  </a:schemeClr>
+                </a:solidFill>
+              </a:defRPr>
+            </a:lvl4pPr>
+            <a:lvl5pPr indent="0">
+              <a:lnSpc>
+                <a:spcPct val="150000"/>
+              </a:lnSpc>
+              <a:spcBef>
+                <a:spcPts val="500"/>
+              </a:spcBef>
+              <a:buFont typeface="Arial" panose="020B0604020202020204" pitchFamily="34" charset="0"/>
+              <a:buNone/>
+              <a:defRPr sz="1600">
+                <a:solidFill>
+                  <a:schemeClr val="tx1">
+                    <a:tint val="75000"/>
+                  </a:schemeClr>
+                </a:solidFill>
+              </a:defRPr>
+            </a:lvl5pPr>
+            <a:lvl6pPr indent="0">
+              <a:lnSpc>
+                <a:spcPct val="90000"/>
+              </a:lnSpc>
+              <a:spcBef>
+                <a:spcPts val="500"/>
+              </a:spcBef>
+              <a:buFont typeface="Arial" panose="020B0604020202020204" pitchFamily="34" charset="0"/>
+              <a:buNone/>
+              <a:defRPr sz="1600">
+                <a:solidFill>
+                  <a:schemeClr val="tx1">
+                    <a:tint val="75000"/>
+                  </a:schemeClr>
+                </a:solidFill>
+              </a:defRPr>
+            </a:lvl6pPr>
+            <a:lvl7pPr indent="0">
+              <a:lnSpc>
+                <a:spcPct val="90000"/>
+              </a:lnSpc>
+              <a:spcBef>
+                <a:spcPts val="500"/>
+              </a:spcBef>
+              <a:buFont typeface="Arial" panose="020B0604020202020204" pitchFamily="34" charset="0"/>
+              <a:buNone/>
+              <a:defRPr sz="1600">
+                <a:solidFill>
+                  <a:schemeClr val="tx1">
+                    <a:tint val="75000"/>
+                  </a:schemeClr>
+                </a:solidFill>
+              </a:defRPr>
+            </a:lvl7pPr>
+            <a:lvl8pPr indent="0">
+              <a:lnSpc>
+                <a:spcPct val="90000"/>
+              </a:lnSpc>
+              <a:spcBef>
+                <a:spcPts val="500"/>
+              </a:spcBef>
+              <a:buFont typeface="Arial" panose="020B0604020202020204" pitchFamily="34" charset="0"/>
+              <a:buNone/>
+              <a:defRPr sz="1600">
+                <a:solidFill>
+                  <a:schemeClr val="tx1">
+                    <a:tint val="75000"/>
+                  </a:schemeClr>
+                </a:solidFill>
+              </a:defRPr>
+            </a:lvl8pPr>
+            <a:lvl9pPr indent="0">
+              <a:lnSpc>
+                <a:spcPct val="90000"/>
+              </a:lnSpc>
+              <a:spcBef>
+                <a:spcPts val="500"/>
+              </a:spcBef>
+              <a:buFont typeface="Arial" panose="020B0604020202020204" pitchFamily="34" charset="0"/>
+              <a:buNone/>
+              <a:defRPr sz="1600">
+                <a:solidFill>
+                  <a:schemeClr val="tx1">
+                    <a:tint val="75000"/>
+                  </a:schemeClr>
+                </a:solidFill>
+              </a:defRPr>
+            </a:lvl9pPr>
+          </a:lstStyle>
           <a:p>
             <a:pPr marL="342900" indent="-342900">
               <a:buFont typeface="Arial" panose="020B0604020202020204" pitchFamily="34" charset="0"/>
               <a:buChar char="•"/>
             </a:pPr>
             <a:r>
-              <a:rPr lang="en-US" b="0" i="0" dirty="0">
-                <a:solidFill>
-                  <a:srgbClr val="1D1C1D"/>
-                </a:solidFill>
-                <a:effectLst/>
-                <a:latin typeface="Slack-Lato"/>
-              </a:rPr>
-              <a:t>PostgreSQL</a:t>
-            </a:r>
-            <a:endParaRPr lang="en-US" dirty="0"/>
+              <a:rPr lang="en-US" dirty="0" err="1"/>
+              <a:t>VSCode</a:t>
+            </a:r>
+            <a:r>
+              <a:rPr lang="en-US" dirty="0"/>
+              <a:t> IDE</a:t>
+            </a:r>
+          </a:p>
+          <a:p>
+            <a:pPr marL="342900" indent="-342900">
+              <a:buFont typeface="Arial" panose="020B0604020202020204" pitchFamily="34" charset="0"/>
+              <a:buChar char="•"/>
+            </a:pPr>
+            <a:r>
+              <a:rPr lang="en-US" dirty="0"/>
+              <a:t>Python 3.11.8</a:t>
+            </a:r>
+          </a:p>
+          <a:p>
+            <a:pPr marL="342900" indent="-342900">
+              <a:buFont typeface="Arial" panose="020B0604020202020204" pitchFamily="34" charset="0"/>
+              <a:buChar char="•"/>
+            </a:pPr>
+            <a:r>
+              <a:rPr lang="en-US" dirty="0"/>
+              <a:t>Django with SQL</a:t>
+            </a:r>
           </a:p>
         </p:txBody>
       </p:sp>
@@ -10297,6 +10240,35 @@
 </file>
 
 <file path=customXml/item1.xml><?xml version="1.0" encoding="utf-8"?>
+<p:properties xmlns:p="http://schemas.microsoft.com/office/2006/metadata/properties" xmlns:xsi="http://www.w3.org/2001/XMLSchema-instance" xmlns:pc="http://schemas.microsoft.com/office/infopath/2007/PartnerControls">
+  <documentManagement>
+    <Status xmlns="71af3243-3dd4-4a8d-8c0d-dd76da1f02a5">Not started</Status>
+    <MediaServiceKeyPoints xmlns="71af3243-3dd4-4a8d-8c0d-dd76da1f02a5" xsi:nil="true"/>
+    <_ip_UnifiedCompliancePolicyUIAction xmlns="http://schemas.microsoft.com/sharepoint/v3" xsi:nil="true"/>
+    <Image xmlns="71af3243-3dd4-4a8d-8c0d-dd76da1f02a5">
+      <Url xsi:nil="true"/>
+      <Description xsi:nil="true"/>
+    </Image>
+    <Background xmlns="71af3243-3dd4-4a8d-8c0d-dd76da1f02a5">false</Background>
+    <_ip_UnifiedCompliancePolicyProperties xmlns="http://schemas.microsoft.com/sharepoint/v3" xsi:nil="true"/>
+    <ImageTagsTaxHTField xmlns="71af3243-3dd4-4a8d-8c0d-dd76da1f02a5">
+      <Terms xmlns="http://schemas.microsoft.com/office/infopath/2007/PartnerControls"/>
+    </ImageTagsTaxHTField>
+    <TaxCatchAll xmlns="230e9df3-be65-4c73-a93b-d1236ebd677e" xsi:nil="true"/>
+  </documentManagement>
+</p:properties>
+</file>
+
+<file path=customXml/item2.xml><?xml version="1.0" encoding="utf-8"?>
+<?mso-contentType ?>
+<FormTemplates xmlns="http://schemas.microsoft.com/sharepoint/v3/contenttype/forms">
+  <Display>DocumentLibraryForm</Display>
+  <Edit>DocumentLibraryForm</Edit>
+  <New>DocumentLibraryForm</New>
+</FormTemplates>
+</file>
+
+<file path=customXml/item3.xml><?xml version="1.0" encoding="utf-8"?>
 <ct:contentTypeSchema xmlns:ct="http://schemas.microsoft.com/office/2006/metadata/contentType" xmlns:ma="http://schemas.microsoft.com/office/2006/metadata/properties/metaAttributes" ct:_="" ma:_="" ma:contentTypeName="Document" ma:contentTypeID="0x01010079F111ED35F8CC479449609E8A0923A6" ma:contentTypeVersion="28" ma:contentTypeDescription="Create a new document." ma:contentTypeScope="" ma:versionID="60f5a4f2d2b0abadcf532d48ebf9cb71">
   <xsd:schema xmlns:xsd="http://www.w3.org/2001/XMLSchema" xmlns:xs="http://www.w3.org/2001/XMLSchema" xmlns:p="http://schemas.microsoft.com/office/2006/metadata/properties" xmlns:ns1="http://schemas.microsoft.com/sharepoint/v3" xmlns:ns2="71af3243-3dd4-4a8d-8c0d-dd76da1f02a5" xmlns:ns3="16c05727-aa75-4e4a-9b5f-8a80a1165891" xmlns:ns4="230e9df3-be65-4c73-a93b-d1236ebd677e" targetNamespace="http://schemas.microsoft.com/office/2006/metadata/properties" ma:root="true" ma:fieldsID="7dd78129e6a1811f84807ad11c651531" ns1:_="" ns2:_="" ns3:_="" ns4:_="">
     <xsd:import namespace="http://schemas.microsoft.com/sharepoint/v3"/>
@@ -10608,36 +10580,27 @@
 </ct:contentTypeSchema>
 </file>
 
-<file path=customXml/item2.xml><?xml version="1.0" encoding="utf-8"?>
-<?mso-contentType ?>
-<FormTemplates xmlns="http://schemas.microsoft.com/sharepoint/v3/contenttype/forms">
-  <Display>DocumentLibraryForm</Display>
-  <Edit>DocumentLibraryForm</Edit>
-  <New>DocumentLibraryForm</New>
-</FormTemplates>
+<file path=customXml/itemProps1.xml><?xml version="1.0" encoding="utf-8"?>
+<ds:datastoreItem xmlns:ds="http://schemas.openxmlformats.org/officeDocument/2006/customXml" ds:itemID="{8002A8ED-1331-4C1D-8649-743D7BE164DD}">
+  <ds:schemaRefs>
+    <ds:schemaRef ds:uri="http://schemas.microsoft.com/office/2006/metadata/properties"/>
+    <ds:schemaRef ds:uri="http://schemas.microsoft.com/office/infopath/2007/PartnerControls"/>
+    <ds:schemaRef ds:uri="71af3243-3dd4-4a8d-8c0d-dd76da1f02a5"/>
+    <ds:schemaRef ds:uri="http://schemas.microsoft.com/sharepoint/v3"/>
+    <ds:schemaRef ds:uri="230e9df3-be65-4c73-a93b-d1236ebd677e"/>
+  </ds:schemaRefs>
+</ds:datastoreItem>
 </file>
 
-<file path=customXml/item3.xml><?xml version="1.0" encoding="utf-8"?>
-<p:properties xmlns:p="http://schemas.microsoft.com/office/2006/metadata/properties" xmlns:xsi="http://www.w3.org/2001/XMLSchema-instance" xmlns:pc="http://schemas.microsoft.com/office/infopath/2007/PartnerControls">
-  <documentManagement>
-    <Status xmlns="71af3243-3dd4-4a8d-8c0d-dd76da1f02a5">Not started</Status>
-    <MediaServiceKeyPoints xmlns="71af3243-3dd4-4a8d-8c0d-dd76da1f02a5" xsi:nil="true"/>
-    <_ip_UnifiedCompliancePolicyUIAction xmlns="http://schemas.microsoft.com/sharepoint/v3" xsi:nil="true"/>
-    <Image xmlns="71af3243-3dd4-4a8d-8c0d-dd76da1f02a5">
-      <Url xsi:nil="true"/>
-      <Description xsi:nil="true"/>
-    </Image>
-    <Background xmlns="71af3243-3dd4-4a8d-8c0d-dd76da1f02a5">false</Background>
-    <_ip_UnifiedCompliancePolicyProperties xmlns="http://schemas.microsoft.com/sharepoint/v3" xsi:nil="true"/>
-    <ImageTagsTaxHTField xmlns="71af3243-3dd4-4a8d-8c0d-dd76da1f02a5">
-      <Terms xmlns="http://schemas.microsoft.com/office/infopath/2007/PartnerControls"/>
-    </ImageTagsTaxHTField>
-    <TaxCatchAll xmlns="230e9df3-be65-4c73-a93b-d1236ebd677e" xsi:nil="true"/>
-  </documentManagement>
-</p:properties>
+<file path=customXml/itemProps2.xml><?xml version="1.0" encoding="utf-8"?>
+<ds:datastoreItem xmlns:ds="http://schemas.openxmlformats.org/officeDocument/2006/customXml" ds:itemID="{99E4EAC9-33DC-4CF0-BA31-C98F61CE4785}">
+  <ds:schemaRefs>
+    <ds:schemaRef ds:uri="http://schemas.microsoft.com/sharepoint/v3/contenttype/forms"/>
+  </ds:schemaRefs>
+</ds:datastoreItem>
 </file>
 
-<file path=customXml/itemProps1.xml><?xml version="1.0" encoding="utf-8"?>
+<file path=customXml/itemProps3.xml><?xml version="1.0" encoding="utf-8"?>
 <ds:datastoreItem xmlns:ds="http://schemas.openxmlformats.org/officeDocument/2006/customXml" ds:itemID="{A3D5DB56-3A71-4638-9571-EE877FD66E96}">
   <ds:schemaRefs>
     <ds:schemaRef ds:uri="http://schemas.microsoft.com/office/2006/metadata/contentType"/>
@@ -10658,26 +10621,6 @@
 </ds:datastoreItem>
 </file>
 
-<file path=customXml/itemProps2.xml><?xml version="1.0" encoding="utf-8"?>
-<ds:datastoreItem xmlns:ds="http://schemas.openxmlformats.org/officeDocument/2006/customXml" ds:itemID="{99E4EAC9-33DC-4CF0-BA31-C98F61CE4785}">
-  <ds:schemaRefs>
-    <ds:schemaRef ds:uri="http://schemas.microsoft.com/sharepoint/v3/contenttype/forms"/>
-  </ds:schemaRefs>
-</ds:datastoreItem>
-</file>
-
-<file path=customXml/itemProps3.xml><?xml version="1.0" encoding="utf-8"?>
-<ds:datastoreItem xmlns:ds="http://schemas.openxmlformats.org/officeDocument/2006/customXml" ds:itemID="{8002A8ED-1331-4C1D-8649-743D7BE164DD}">
-  <ds:schemaRefs>
-    <ds:schemaRef ds:uri="http://schemas.microsoft.com/office/2006/metadata/properties"/>
-    <ds:schemaRef ds:uri="http://schemas.microsoft.com/office/infopath/2007/PartnerControls"/>
-    <ds:schemaRef ds:uri="71af3243-3dd4-4a8d-8c0d-dd76da1f02a5"/>
-    <ds:schemaRef ds:uri="http://schemas.microsoft.com/sharepoint/v3"/>
-    <ds:schemaRef ds:uri="230e9df3-be65-4c73-a93b-d1236ebd677e"/>
-  </ds:schemaRefs>
-</ds:datastoreItem>
-</file>
-
 <file path=docMetadata/LabelInfo.xml><?xml version="1.0" encoding="utf-8"?>
 <clbl:labelList xmlns:clbl="http://schemas.microsoft.com/office/2020/mipLabelMetadata"/>
 </file>
</xml_diff>